<commit_message>
adding local slide decks
</commit_message>
<xml_diff>
--- a/340/340.pptx
+++ b/340/340.pptx
@@ -5,7 +5,7 @@
     <p:sldMasterId id="2147483816" r:id="rId1"/>
   </p:sldMasterIdLst>
   <p:notesMasterIdLst>
-    <p:notesMasterId r:id="rId27"/>
+    <p:notesMasterId r:id="rId28"/>
   </p:notesMasterIdLst>
   <p:sldIdLst>
     <p:sldId id="256" r:id="rId2"/>
@@ -30,9 +30,10 @@
     <p:sldId id="347" r:id="rId21"/>
     <p:sldId id="348" r:id="rId22"/>
     <p:sldId id="349" r:id="rId23"/>
-    <p:sldId id="350" r:id="rId24"/>
-    <p:sldId id="333" r:id="rId25"/>
-    <p:sldId id="328" r:id="rId26"/>
+    <p:sldId id="351" r:id="rId24"/>
+    <p:sldId id="350" r:id="rId25"/>
+    <p:sldId id="333" r:id="rId26"/>
+    <p:sldId id="328" r:id="rId27"/>
   </p:sldIdLst>
   <p:sldSz cx="9144000" cy="6858000" type="screen4x3"/>
   <p:notesSz cx="6858000" cy="9144000"/>
@@ -2388,7 +2389,7 @@
       </p:grpSpPr>
       <p:sp>
         <p:nvSpPr>
-          <p:cNvPr id="17409" name="Rectangle 1"/>
+          <p:cNvPr id="13313" name="Rectangle 1"/>
           <p:cNvSpPr>
             <a:spLocks noGrp="1" noRot="1" noChangeAspect="1" noChangeArrowheads="1"/>
           </p:cNvSpPr>
@@ -2405,7 +2406,7 @@
       </p:sp>
       <p:sp>
         <p:nvSpPr>
-          <p:cNvPr id="17410" name="Rectangle 2"/>
+          <p:cNvPr id="13314" name="Rectangle 2"/>
           <p:cNvSpPr>
             <a:spLocks noGrp="1" noChangeArrowheads="1"/>
           </p:cNvSpPr>
@@ -2440,202 +2441,18 @@
           <a:bodyPr/>
           <a:lstStyle/>
           <a:p>
-            <a:pPr marL="119063" eaLnBrk="1" hangingPunct="1">
-              <a:spcBef>
-                <a:spcPts val="450"/>
-              </a:spcBef>
-            </a:pPr>
-            <a:r>
-              <a:rPr lang="en-US" dirty="0" smtClean="0">
-                <a:solidFill>
-                  <a:srgbClr val="000000"/>
-                </a:solidFill>
-                <a:latin typeface="Times New Roman" charset="0"/>
-                <a:ea typeface="ＭＳ Ｐゴシック" charset="0"/>
-                <a:cs typeface="Times New Roman" charset="0"/>
-                <a:sym typeface="Times New Roman" charset="0"/>
-              </a:rPr>
-              <a:t>For this demo, follow the wiki guide for iOS, this process works smoother.</a:t>
-            </a:r>
-          </a:p>
-          <a:p>
-            <a:pPr marL="290513" indent="-171450" eaLnBrk="1" hangingPunct="1">
-              <a:spcBef>
-                <a:spcPts val="450"/>
-              </a:spcBef>
+            <a:pPr marL="250825" indent="-171450" eaLnBrk="1" hangingPunct="1">
               <a:buFontTx/>
               <a:buChar char="-"/>
             </a:pPr>
-            <a:r>
-              <a:rPr lang="en-US" dirty="0" smtClean="0">
-                <a:solidFill>
-                  <a:srgbClr val="000000"/>
-                </a:solidFill>
-                <a:latin typeface="Times New Roman" charset="0"/>
-                <a:ea typeface="ＭＳ Ｐゴシック" charset="0"/>
-                <a:cs typeface="Times New Roman" charset="0"/>
-                <a:sym typeface="Times New Roman" charset="0"/>
-              </a:rPr>
-              <a:t>generate the project</a:t>
-            </a:r>
-          </a:p>
-          <a:p>
-            <a:pPr marL="290513" indent="-171450" eaLnBrk="1" hangingPunct="1">
-              <a:spcBef>
-                <a:spcPts val="450"/>
-              </a:spcBef>
-              <a:buFontTx/>
-              <a:buChar char="-"/>
-            </a:pPr>
-            <a:r>
-              <a:rPr lang="en-US" dirty="0" smtClean="0">
-                <a:solidFill>
-                  <a:srgbClr val="000000"/>
-                </a:solidFill>
-                <a:latin typeface="Times New Roman" charset="0"/>
-                <a:ea typeface="ＭＳ Ｐゴシック" charset="0"/>
-                <a:cs typeface="Times New Roman" charset="0"/>
-                <a:sym typeface="Times New Roman" charset="0"/>
-              </a:rPr>
-              <a:t>build the module</a:t>
-            </a:r>
-          </a:p>
-          <a:p>
-            <a:pPr marL="290513" indent="-171450" eaLnBrk="1" hangingPunct="1">
-              <a:spcBef>
-                <a:spcPts val="450"/>
-              </a:spcBef>
-              <a:buFontTx/>
-              <a:buChar char="-"/>
-            </a:pPr>
-            <a:r>
-              <a:rPr lang="en-US" dirty="0" smtClean="0">
-                <a:solidFill>
-                  <a:srgbClr val="000000"/>
-                </a:solidFill>
-                <a:latin typeface="Times New Roman" charset="0"/>
-                <a:ea typeface="ＭＳ Ｐゴシック" charset="0"/>
-                <a:cs typeface="Times New Roman" charset="0"/>
-                <a:sym typeface="Times New Roman" charset="0"/>
-              </a:rPr>
-              <a:t>make a “Hello World” function</a:t>
-            </a:r>
-          </a:p>
-          <a:p>
-            <a:pPr marL="290513" indent="-171450" eaLnBrk="1" hangingPunct="1">
-              <a:spcBef>
-                <a:spcPts val="450"/>
-              </a:spcBef>
-              <a:buFontTx/>
-              <a:buChar char="-"/>
-            </a:pPr>
-            <a:r>
-              <a:rPr lang="en-US" dirty="0" smtClean="0">
-                <a:solidFill>
-                  <a:srgbClr val="000000"/>
-                </a:solidFill>
-                <a:latin typeface="Times New Roman" charset="0"/>
-                <a:ea typeface="ＭＳ Ｐゴシック" charset="0"/>
-                <a:cs typeface="Times New Roman" charset="0"/>
-                <a:sym typeface="Times New Roman" charset="0"/>
-              </a:rPr>
-              <a:t>install it to a </a:t>
-            </a:r>
-            <a:r>
-              <a:rPr lang="en-US" dirty="0" err="1" smtClean="0">
-                <a:solidFill>
-                  <a:srgbClr val="000000"/>
-                </a:solidFill>
-                <a:latin typeface="Times New Roman" charset="0"/>
-                <a:ea typeface="ＭＳ Ｐゴシック" charset="0"/>
-                <a:cs typeface="Times New Roman" charset="0"/>
-                <a:sym typeface="Times New Roman" charset="0"/>
-              </a:rPr>
-              <a:t>TiStudio</a:t>
-            </a:r>
-            <a:r>
-              <a:rPr lang="en-US" baseline="0" dirty="0" smtClean="0">
-                <a:solidFill>
-                  <a:srgbClr val="000000"/>
-                </a:solidFill>
-                <a:latin typeface="Times New Roman" charset="0"/>
-                <a:ea typeface="ＭＳ Ｐゴシック" charset="0"/>
-                <a:cs typeface="Times New Roman" charset="0"/>
-                <a:sym typeface="Times New Roman" charset="0"/>
-              </a:rPr>
-              <a:t> project</a:t>
-            </a:r>
-          </a:p>
-          <a:p>
-            <a:pPr marL="290513" indent="-171450" eaLnBrk="1" hangingPunct="1">
-              <a:spcBef>
-                <a:spcPts val="450"/>
-              </a:spcBef>
-              <a:buFontTx/>
-              <a:buChar char="-"/>
-            </a:pPr>
-            <a:r>
-              <a:rPr lang="en-US" baseline="0" dirty="0" smtClean="0">
-                <a:solidFill>
-                  <a:srgbClr val="000000"/>
-                </a:solidFill>
-                <a:latin typeface="Times New Roman" charset="0"/>
-                <a:ea typeface="ＭＳ Ｐゴシック" charset="0"/>
-                <a:cs typeface="Times New Roman" charset="0"/>
-                <a:sym typeface="Times New Roman" charset="0"/>
-              </a:rPr>
-              <a:t>configure in </a:t>
-            </a:r>
-            <a:r>
-              <a:rPr lang="en-US" baseline="0" dirty="0" err="1" smtClean="0">
-                <a:solidFill>
-                  <a:srgbClr val="000000"/>
-                </a:solidFill>
-                <a:latin typeface="Times New Roman" charset="0"/>
-                <a:ea typeface="ＭＳ Ｐゴシック" charset="0"/>
-                <a:cs typeface="Times New Roman" charset="0"/>
-                <a:sym typeface="Times New Roman" charset="0"/>
-              </a:rPr>
-              <a:t>tiapp.xml</a:t>
-            </a:r>
-            <a:endParaRPr lang="en-US" baseline="0" dirty="0" smtClean="0">
+            <a:endParaRPr lang="en-US" b="1" dirty="0">
               <a:solidFill>
                 <a:srgbClr val="000000"/>
               </a:solidFill>
-              <a:latin typeface="Times New Roman" charset="0"/>
+              <a:latin typeface="Lucida Grande" charset="0"/>
               <a:ea typeface="ＭＳ Ｐゴシック" charset="0"/>
-              <a:cs typeface="Times New Roman" charset="0"/>
-              <a:sym typeface="Times New Roman" charset="0"/>
-            </a:endParaRPr>
-          </a:p>
-          <a:p>
-            <a:pPr marL="290513" indent="-171450" eaLnBrk="1" hangingPunct="1">
-              <a:spcBef>
-                <a:spcPts val="450"/>
-              </a:spcBef>
-              <a:buFontTx/>
-              <a:buChar char="-"/>
-            </a:pPr>
-            <a:r>
-              <a:rPr lang="en-US" baseline="0" dirty="0" smtClean="0">
-                <a:solidFill>
-                  <a:srgbClr val="000000"/>
-                </a:solidFill>
-                <a:latin typeface="Times New Roman" charset="0"/>
-                <a:ea typeface="ＭＳ Ｐゴシック" charset="0"/>
-                <a:cs typeface="Times New Roman" charset="0"/>
-                <a:sym typeface="Times New Roman" charset="0"/>
-              </a:rPr>
-              <a:t>run app, use JS function you defined.</a:t>
-            </a:r>
-            <a:endParaRPr lang="en-US" dirty="0">
-              <a:solidFill>
-                <a:srgbClr val="000000"/>
-              </a:solidFill>
-              <a:latin typeface="Times New Roman" charset="0"/>
-              <a:ea typeface="ＭＳ Ｐゴシック" charset="0"/>
-              <a:cs typeface="Times New Roman" charset="0"/>
-              <a:sym typeface="Times New Roman" charset="0"/>
+              <a:cs typeface="Lucida Grande" charset="0"/>
+              <a:sym typeface="Lucida Grande" charset="0"/>
             </a:endParaRPr>
           </a:p>
         </p:txBody>
@@ -2724,6 +2541,189 @@
                 <a:spcPts val="450"/>
               </a:spcBef>
             </a:pPr>
+            <a:r>
+              <a:rPr lang="en-US" dirty="0" smtClean="0">
+                <a:solidFill>
+                  <a:srgbClr val="000000"/>
+                </a:solidFill>
+                <a:latin typeface="Times New Roman" charset="0"/>
+                <a:ea typeface="ＭＳ Ｐゴシック" charset="0"/>
+                <a:cs typeface="Times New Roman" charset="0"/>
+                <a:sym typeface="Times New Roman" charset="0"/>
+              </a:rPr>
+              <a:t>For this demo, follow the wiki guide for iOS, this process works smoother.</a:t>
+            </a:r>
+          </a:p>
+          <a:p>
+            <a:pPr marL="290513" indent="-171450" eaLnBrk="1" hangingPunct="1">
+              <a:spcBef>
+                <a:spcPts val="450"/>
+              </a:spcBef>
+              <a:buFontTx/>
+              <a:buChar char="-"/>
+            </a:pPr>
+            <a:r>
+              <a:rPr lang="en-US" dirty="0" smtClean="0">
+                <a:solidFill>
+                  <a:srgbClr val="000000"/>
+                </a:solidFill>
+                <a:latin typeface="Times New Roman" charset="0"/>
+                <a:ea typeface="ＭＳ Ｐゴシック" charset="0"/>
+                <a:cs typeface="Times New Roman" charset="0"/>
+                <a:sym typeface="Times New Roman" charset="0"/>
+              </a:rPr>
+              <a:t>generate the project</a:t>
+            </a:r>
+          </a:p>
+          <a:p>
+            <a:pPr marL="290513" indent="-171450" eaLnBrk="1" hangingPunct="1">
+              <a:spcBef>
+                <a:spcPts val="450"/>
+              </a:spcBef>
+              <a:buFontTx/>
+              <a:buChar char="-"/>
+            </a:pPr>
+            <a:r>
+              <a:rPr lang="en-US" dirty="0" smtClean="0">
+                <a:solidFill>
+                  <a:srgbClr val="000000"/>
+                </a:solidFill>
+                <a:latin typeface="Times New Roman" charset="0"/>
+                <a:ea typeface="ＭＳ Ｐゴシック" charset="0"/>
+                <a:cs typeface="Times New Roman" charset="0"/>
+                <a:sym typeface="Times New Roman" charset="0"/>
+              </a:rPr>
+              <a:t>build the module</a:t>
+            </a:r>
+          </a:p>
+          <a:p>
+            <a:pPr marL="290513" indent="-171450" eaLnBrk="1" hangingPunct="1">
+              <a:spcBef>
+                <a:spcPts val="450"/>
+              </a:spcBef>
+              <a:buFontTx/>
+              <a:buChar char="-"/>
+            </a:pPr>
+            <a:r>
+              <a:rPr lang="en-US" dirty="0" smtClean="0">
+                <a:solidFill>
+                  <a:srgbClr val="000000"/>
+                </a:solidFill>
+                <a:latin typeface="Times New Roman" charset="0"/>
+                <a:ea typeface="ＭＳ Ｐゴシック" charset="0"/>
+                <a:cs typeface="Times New Roman" charset="0"/>
+                <a:sym typeface="Times New Roman" charset="0"/>
+              </a:rPr>
+              <a:t>make a “Hello World” function</a:t>
+            </a:r>
+          </a:p>
+          <a:p>
+            <a:pPr marL="290513" indent="-171450" eaLnBrk="1" hangingPunct="1">
+              <a:spcBef>
+                <a:spcPts val="450"/>
+              </a:spcBef>
+              <a:buFontTx/>
+              <a:buChar char="-"/>
+            </a:pPr>
+            <a:r>
+              <a:rPr lang="en-US" dirty="0" smtClean="0">
+                <a:solidFill>
+                  <a:srgbClr val="000000"/>
+                </a:solidFill>
+                <a:latin typeface="Times New Roman" charset="0"/>
+                <a:ea typeface="ＭＳ Ｐゴシック" charset="0"/>
+                <a:cs typeface="Times New Roman" charset="0"/>
+                <a:sym typeface="Times New Roman" charset="0"/>
+              </a:rPr>
+              <a:t>install it to a </a:t>
+            </a:r>
+            <a:r>
+              <a:rPr lang="en-US" dirty="0" err="1" smtClean="0">
+                <a:solidFill>
+                  <a:srgbClr val="000000"/>
+                </a:solidFill>
+                <a:latin typeface="Times New Roman" charset="0"/>
+                <a:ea typeface="ＭＳ Ｐゴシック" charset="0"/>
+                <a:cs typeface="Times New Roman" charset="0"/>
+                <a:sym typeface="Times New Roman" charset="0"/>
+              </a:rPr>
+              <a:t>TiStudio</a:t>
+            </a:r>
+            <a:r>
+              <a:rPr lang="en-US" baseline="0" dirty="0" smtClean="0">
+                <a:solidFill>
+                  <a:srgbClr val="000000"/>
+                </a:solidFill>
+                <a:latin typeface="Times New Roman" charset="0"/>
+                <a:ea typeface="ＭＳ Ｐゴシック" charset="0"/>
+                <a:cs typeface="Times New Roman" charset="0"/>
+                <a:sym typeface="Times New Roman" charset="0"/>
+              </a:rPr>
+              <a:t> project</a:t>
+            </a:r>
+          </a:p>
+          <a:p>
+            <a:pPr marL="290513" indent="-171450" eaLnBrk="1" hangingPunct="1">
+              <a:spcBef>
+                <a:spcPts val="450"/>
+              </a:spcBef>
+              <a:buFontTx/>
+              <a:buChar char="-"/>
+            </a:pPr>
+            <a:r>
+              <a:rPr lang="en-US" baseline="0" dirty="0" smtClean="0">
+                <a:solidFill>
+                  <a:srgbClr val="000000"/>
+                </a:solidFill>
+                <a:latin typeface="Times New Roman" charset="0"/>
+                <a:ea typeface="ＭＳ Ｐゴシック" charset="0"/>
+                <a:cs typeface="Times New Roman" charset="0"/>
+                <a:sym typeface="Times New Roman" charset="0"/>
+              </a:rPr>
+              <a:t>configure in </a:t>
+            </a:r>
+            <a:r>
+              <a:rPr lang="en-US" baseline="0" dirty="0" err="1" smtClean="0">
+                <a:solidFill>
+                  <a:srgbClr val="000000"/>
+                </a:solidFill>
+                <a:latin typeface="Times New Roman" charset="0"/>
+                <a:ea typeface="ＭＳ Ｐゴシック" charset="0"/>
+                <a:cs typeface="Times New Roman" charset="0"/>
+                <a:sym typeface="Times New Roman" charset="0"/>
+              </a:rPr>
+              <a:t>tiapp.xml</a:t>
+            </a:r>
+            <a:endParaRPr lang="en-US" baseline="0" dirty="0" smtClean="0">
+              <a:solidFill>
+                <a:srgbClr val="000000"/>
+              </a:solidFill>
+              <a:latin typeface="Times New Roman" charset="0"/>
+              <a:ea typeface="ＭＳ Ｐゴシック" charset="0"/>
+              <a:cs typeface="Times New Roman" charset="0"/>
+              <a:sym typeface="Times New Roman" charset="0"/>
+            </a:endParaRPr>
+          </a:p>
+          <a:p>
+            <a:pPr marL="290513" indent="-171450" eaLnBrk="1" hangingPunct="1">
+              <a:spcBef>
+                <a:spcPts val="450"/>
+              </a:spcBef>
+              <a:buFontTx/>
+              <a:buChar char="-"/>
+            </a:pPr>
+            <a:r>
+              <a:rPr lang="en-US" baseline="0" dirty="0" smtClean="0">
+                <a:solidFill>
+                  <a:srgbClr val="000000"/>
+                </a:solidFill>
+                <a:latin typeface="Times New Roman" charset="0"/>
+                <a:ea typeface="ＭＳ Ｐゴシック" charset="0"/>
+                <a:cs typeface="Times New Roman" charset="0"/>
+                <a:sym typeface="Times New Roman" charset="0"/>
+              </a:rPr>
+              <a:t>run app, use JS function you defined.</a:t>
+            </a:r>
             <a:endParaRPr lang="en-US" dirty="0">
               <a:solidFill>
                 <a:srgbClr val="000000"/>
@@ -2745,6 +2745,102 @@
 </file>
 
 <file path=ppt/notesSlides/notesSlide25.xml><?xml version="1.0" encoding="utf-8"?>
+<p:notes xmlns:a="http://schemas.openxmlformats.org/drawingml/2006/main" xmlns:r="http://schemas.openxmlformats.org/officeDocument/2006/relationships" xmlns:p="http://schemas.openxmlformats.org/presentationml/2006/main">
+  <p:cSld>
+    <p:spTree>
+      <p:nvGrpSpPr>
+        <p:cNvPr id="1" name=""/>
+        <p:cNvGrpSpPr/>
+        <p:nvPr/>
+      </p:nvGrpSpPr>
+      <p:grpSpPr>
+        <a:xfrm>
+          <a:off x="0" y="0"/>
+          <a:ext cx="0" cy="0"/>
+          <a:chOff x="0" y="0"/>
+          <a:chExt cx="0" cy="0"/>
+        </a:xfrm>
+      </p:grpSpPr>
+      <p:sp>
+        <p:nvSpPr>
+          <p:cNvPr id="17409" name="Rectangle 1"/>
+          <p:cNvSpPr>
+            <a:spLocks noGrp="1" noRot="1" noChangeAspect="1" noChangeArrowheads="1"/>
+          </p:cNvSpPr>
+          <p:nvPr>
+            <p:ph type="sldImg"/>
+          </p:nvPr>
+        </p:nvSpPr>
+        <p:spPr>
+          <a:solidFill>
+            <a:srgbClr val="FFFFFF"/>
+          </a:solidFill>
+          <a:ln/>
+        </p:spPr>
+      </p:sp>
+      <p:sp>
+        <p:nvSpPr>
+          <p:cNvPr id="17410" name="Rectangle 2"/>
+          <p:cNvSpPr>
+            <a:spLocks noGrp="1" noChangeArrowheads="1"/>
+          </p:cNvSpPr>
+          <p:nvPr>
+            <p:ph type="body" idx="1"/>
+          </p:nvPr>
+        </p:nvSpPr>
+        <p:spPr>
+          <a:noFill/>
+          <a:ln/>
+          <a:extLst>
+            <a:ext uri="{909E8E84-426E-40dd-AFC4-6F175D3DCCD1}">
+              <a14:hiddenFill xmlns:a14="http://schemas.microsoft.com/office/drawing/2010/main">
+                <a:solidFill>
+                  <a:srgbClr val="FFFFFF"/>
+                </a:solidFill>
+              </a14:hiddenFill>
+            </a:ext>
+            <a:ext uri="{91240B29-F687-4f45-9708-019B960494DF}">
+              <a14:hiddenLine xmlns:a14="http://schemas.microsoft.com/office/drawing/2010/main" w="9525">
+                <a:solidFill>
+                  <a:srgbClr val="000000"/>
+                </a:solidFill>
+                <a:miter lim="800000"/>
+                <a:headEnd/>
+                <a:tailEnd/>
+              </a14:hiddenLine>
+            </a:ext>
+          </a:extLst>
+        </p:spPr>
+        <p:txBody>
+          <a:bodyPr/>
+          <a:lstStyle/>
+          <a:p>
+            <a:pPr marL="119063" eaLnBrk="1" hangingPunct="1">
+              <a:spcBef>
+                <a:spcPts val="450"/>
+              </a:spcBef>
+            </a:pPr>
+            <a:endParaRPr lang="en-US" dirty="0">
+              <a:solidFill>
+                <a:srgbClr val="000000"/>
+              </a:solidFill>
+              <a:latin typeface="Times New Roman" charset="0"/>
+              <a:ea typeface="ＭＳ Ｐゴシック" charset="0"/>
+              <a:cs typeface="Times New Roman" charset="0"/>
+              <a:sym typeface="Times New Roman" charset="0"/>
+            </a:endParaRPr>
+          </a:p>
+        </p:txBody>
+      </p:sp>
+    </p:spTree>
+  </p:cSld>
+  <p:clrMapOvr>
+    <a:masterClrMapping/>
+  </p:clrMapOvr>
+</p:notes>
+</file>
+
+<file path=ppt/notesSlides/notesSlide26.xml><?xml version="1.0" encoding="utf-8"?>
 <p:notes xmlns:a="http://schemas.openxmlformats.org/drawingml/2006/main" xmlns:r="http://schemas.openxmlformats.org/officeDocument/2006/relationships" xmlns:p="http://schemas.openxmlformats.org/presentationml/2006/main">
   <p:cSld>
     <p:spTree>
@@ -4337,7 +4433,7 @@
               <a:pPr>
                 <a:defRPr/>
               </a:pPr>
-              <a:t>6/15/11</a:t>
+              <a:t>6/16/11</a:t>
             </a:fld>
             <a:endParaRPr lang="en-US"/>
           </a:p>
@@ -4758,7 +4854,7 @@
               <a:pPr>
                 <a:defRPr/>
               </a:pPr>
-              <a:t>6/15/11</a:t>
+              <a:t>6/16/11</a:t>
             </a:fld>
             <a:endParaRPr lang="en-US"/>
           </a:p>
@@ -5483,7 +5579,7 @@
               <a:pPr>
                 <a:defRPr/>
               </a:pPr>
-              <a:t>6/15/11</a:t>
+              <a:t>6/16/11</a:t>
             </a:fld>
             <a:endParaRPr lang="en-US"/>
           </a:p>
@@ -6036,7 +6132,7 @@
               <a:pPr>
                 <a:defRPr/>
               </a:pPr>
-              <a:t>6/15/11</a:t>
+              <a:t>6/16/11</a:t>
             </a:fld>
             <a:endParaRPr lang="en-US"/>
           </a:p>
@@ -6387,7 +6483,7 @@
               <a:pPr>
                 <a:defRPr/>
               </a:pPr>
-              <a:t>6/15/11</a:t>
+              <a:t>6/16/11</a:t>
             </a:fld>
             <a:endParaRPr lang="en-US"/>
           </a:p>
@@ -6745,7 +6841,7 @@
               <a:pPr>
                 <a:defRPr/>
               </a:pPr>
-              <a:t>6/15/11</a:t>
+              <a:t>6/16/11</a:t>
             </a:fld>
             <a:endParaRPr lang="en-US"/>
           </a:p>
@@ -6980,7 +7076,7 @@
               <a:pPr>
                 <a:defRPr/>
               </a:pPr>
-              <a:t>6/15/11</a:t>
+              <a:t>6/16/11</a:t>
             </a:fld>
             <a:endParaRPr lang="en-US"/>
           </a:p>
@@ -7272,7 +7368,7 @@
               <a:pPr>
                 <a:defRPr/>
               </a:pPr>
-              <a:t>6/15/11</a:t>
+              <a:t>6/16/11</a:t>
             </a:fld>
             <a:endParaRPr lang="en-US"/>
           </a:p>
@@ -8527,11 +8623,6 @@
               </a:rPr>
               <a:t>Proxy</a:t>
             </a:r>
-            <a:endParaRPr lang="en-US" dirty="0" smtClean="0">
-              <a:latin typeface="Trebuchet MS" charset="0"/>
-              <a:ea typeface="ヒラギノ角ゴ ProN W3" charset="0"/>
-              <a:cs typeface="ヒラギノ角ゴ ProN W3" charset="0"/>
-            </a:endParaRPr>
           </a:p>
           <a:p>
             <a:pPr eaLnBrk="1" hangingPunct="1"/>
@@ -8543,11 +8634,6 @@
               </a:rPr>
               <a:t>- interface between native code and JavaScript – a module will have at least one proxy</a:t>
             </a:r>
-            <a:endParaRPr lang="en-US" dirty="0" smtClean="0">
-              <a:latin typeface="Trebuchet MS" charset="0"/>
-              <a:ea typeface="ヒラギノ角ゴ ProN W3" charset="0"/>
-              <a:cs typeface="ヒラギノ角ゴ ProN W3" charset="0"/>
-            </a:endParaRPr>
           </a:p>
           <a:p>
             <a:pPr eaLnBrk="1" hangingPunct="1"/>
@@ -8578,11 +8664,6 @@
               </a:rPr>
               <a:t>- actual native representation of a view object (for UI components)</a:t>
             </a:r>
-            <a:endParaRPr lang="en-US" dirty="0" smtClean="0">
-              <a:latin typeface="Trebuchet MS" charset="0"/>
-              <a:ea typeface="ヒラギノ角ゴ ProN W3" charset="0"/>
-              <a:cs typeface="ヒラギノ角ゴ ProN W3" charset="0"/>
-            </a:endParaRPr>
           </a:p>
           <a:p>
             <a:pPr eaLnBrk="1" hangingPunct="1"/>
@@ -11485,23 +11566,7 @@
                 <a:ea typeface="ヒラギノ角ゴ ProN W3" charset="0"/>
                 <a:cs typeface="ヒラギノ角ゴ ProN W3" charset="0"/>
               </a:rPr>
-              <a:t>From </a:t>
-            </a:r>
-            <a:r>
-              <a:rPr lang="en-US" dirty="0" smtClean="0">
-                <a:latin typeface="Trebuchet MS" charset="0"/>
-                <a:ea typeface="ヒラギノ角ゴ ProN W3" charset="0"/>
-                <a:cs typeface="ヒラギノ角ゴ ProN W3" charset="0"/>
-              </a:rPr>
-              <a:t>Geolocation</a:t>
-            </a:r>
-            <a:r>
-              <a:rPr lang="en-US" dirty="0" smtClean="0">
-                <a:latin typeface="Trebuchet MS" charset="0"/>
-                <a:ea typeface="ヒラギノ角ゴ ProN W3" charset="0"/>
-                <a:cs typeface="ヒラギノ角ゴ ProN W3" charset="0"/>
-              </a:rPr>
-              <a:t>Module.m:</a:t>
+              <a:t>From GeolocationModule.m:</a:t>
             </a:r>
             <a:endParaRPr lang="en-US" dirty="0">
               <a:latin typeface="Trebuchet MS" charset="0"/>
@@ -11799,39 +11864,7 @@
                 <a:ea typeface="ヒラギノ角ゴ ProN W3" charset="0"/>
                 <a:cs typeface="ヒラギノ角ゴ ProN W3" charset="0"/>
               </a:rPr>
-              <a:t>From </a:t>
-            </a:r>
-            <a:r>
-              <a:rPr lang="en-US" dirty="0" smtClean="0">
-                <a:latin typeface="Trebuchet MS" charset="0"/>
-                <a:ea typeface="ヒラギノ角ゴ ProN W3" charset="0"/>
-                <a:cs typeface="ヒラギノ角ゴ ProN W3" charset="0"/>
-              </a:rPr>
-              <a:t>Geolocation</a:t>
-            </a:r>
-            <a:r>
-              <a:rPr lang="en-US" dirty="0" smtClean="0">
-                <a:latin typeface="Trebuchet MS" charset="0"/>
-                <a:ea typeface="ヒラギノ角ゴ ProN W3" charset="0"/>
-                <a:cs typeface="ヒラギノ角ゴ ProN W3" charset="0"/>
-              </a:rPr>
-              <a:t>Module</a:t>
-            </a:r>
-            <a:r>
-              <a:rPr lang="en-US" dirty="0" smtClean="0">
-                <a:latin typeface="Trebuchet MS" charset="0"/>
-                <a:ea typeface="ヒラギノ角ゴ ProN W3" charset="0"/>
-                <a:cs typeface="ヒラギノ角ゴ ProN W3" charset="0"/>
-              </a:rPr>
-              <a:t>.java</a:t>
-            </a:r>
-            <a:r>
-              <a:rPr lang="en-US" dirty="0" smtClean="0">
-                <a:latin typeface="Trebuchet MS" charset="0"/>
-                <a:ea typeface="ヒラギノ角ゴ ProN W3" charset="0"/>
-                <a:cs typeface="ヒラギノ角ゴ ProN W3" charset="0"/>
-              </a:rPr>
-              <a:t>:</a:t>
+              <a:t>From GeolocationModule.java:</a:t>
             </a:r>
             <a:endParaRPr lang="en-US" dirty="0">
               <a:latin typeface="Trebuchet MS" charset="0"/>
@@ -13951,7 +13984,7 @@
       </p:grpSpPr>
       <p:pic>
         <p:nvPicPr>
-          <p:cNvPr id="16385" name="Picture 1"/>
+          <p:cNvPr id="12289" name="Picture 1"/>
           <p:cNvPicPr>
             <a:picLocks noChangeArrowheads="1"/>
           </p:cNvPicPr>
@@ -14003,70 +14036,270 @@
           </a:extLst>
         </p:spPr>
       </p:pic>
+      <p:pic>
+        <p:nvPicPr>
+          <p:cNvPr id="12290" name="Picture 3"/>
+          <p:cNvPicPr>
+            <a:picLocks noChangeArrowheads="1"/>
+          </p:cNvPicPr>
+          <p:nvPr/>
+        </p:nvPicPr>
+        <p:blipFill>
+          <a:blip r:embed="rId4">
+            <a:extLst>
+              <a:ext uri="{28A0092B-C50C-407E-A947-70E740481C1C}">
+                <a14:useLocalDpi xmlns:a14="http://schemas.microsoft.com/office/drawing/2010/main" val="0"/>
+              </a:ext>
+            </a:extLst>
+          </a:blip>
+          <a:srcRect/>
+          <a:stretch>
+            <a:fillRect/>
+          </a:stretch>
+        </p:blipFill>
+        <p:spPr bwMode="auto">
+          <a:xfrm>
+            <a:off x="0" y="0"/>
+            <a:ext cx="9144000" cy="1176338"/>
+          </a:xfrm>
+          <a:prstGeom prst="rect">
+            <a:avLst/>
+          </a:prstGeom>
+          <a:noFill/>
+          <a:ln>
+            <a:noFill/>
+          </a:ln>
+          <a:extLst>
+            <a:ext uri="{909E8E84-426E-40dd-AFC4-6F175D3DCCD1}">
+              <a14:hiddenFill xmlns:a14="http://schemas.microsoft.com/office/drawing/2010/main">
+                <a:solidFill>
+                  <a:srgbClr val="FFFFFF"/>
+                </a:solidFill>
+              </a14:hiddenFill>
+            </a:ext>
+            <a:ext uri="{91240B29-F687-4f45-9708-019B960494DF}">
+              <a14:hiddenLine xmlns:a14="http://schemas.microsoft.com/office/drawing/2010/main" w="9525">
+                <a:solidFill>
+                  <a:srgbClr val="000000"/>
+                </a:solidFill>
+                <a:miter lim="800000"/>
+                <a:headEnd/>
+                <a:tailEnd/>
+              </a14:hiddenLine>
+            </a:ext>
+          </a:extLst>
+        </p:spPr>
+      </p:pic>
+      <p:pic>
+        <p:nvPicPr>
+          <p:cNvPr id="12291" name="Picture 4"/>
+          <p:cNvPicPr>
+            <a:picLocks noChangeArrowheads="1"/>
+          </p:cNvPicPr>
+          <p:nvPr/>
+        </p:nvPicPr>
+        <p:blipFill>
+          <a:blip r:embed="rId3">
+            <a:extLst>
+              <a:ext uri="{28A0092B-C50C-407E-A947-70E740481C1C}">
+                <a14:useLocalDpi xmlns:a14="http://schemas.microsoft.com/office/drawing/2010/main" val="0"/>
+              </a:ext>
+            </a:extLst>
+          </a:blip>
+          <a:srcRect/>
+          <a:stretch>
+            <a:fillRect/>
+          </a:stretch>
+        </p:blipFill>
+        <p:spPr bwMode="auto">
+          <a:xfrm>
+            <a:off x="8505825" y="6311900"/>
+            <a:ext cx="442913" cy="357188"/>
+          </a:xfrm>
+          <a:prstGeom prst="rect">
+            <a:avLst/>
+          </a:prstGeom>
+          <a:noFill/>
+          <a:ln>
+            <a:noFill/>
+          </a:ln>
+          <a:extLst>
+            <a:ext uri="{909E8E84-426E-40dd-AFC4-6F175D3DCCD1}">
+              <a14:hiddenFill xmlns:a14="http://schemas.microsoft.com/office/drawing/2010/main">
+                <a:solidFill>
+                  <a:srgbClr val="FFFFFF"/>
+                </a:solidFill>
+              </a14:hiddenFill>
+            </a:ext>
+            <a:ext uri="{91240B29-F687-4f45-9708-019B960494DF}">
+              <a14:hiddenLine xmlns:a14="http://schemas.microsoft.com/office/drawing/2010/main" w="9525">
+                <a:solidFill>
+                  <a:srgbClr val="000000"/>
+                </a:solidFill>
+                <a:miter lim="800000"/>
+                <a:headEnd/>
+                <a:tailEnd/>
+              </a14:hiddenLine>
+            </a:ext>
+          </a:extLst>
+        </p:spPr>
+      </p:pic>
       <p:sp>
         <p:nvSpPr>
-          <p:cNvPr id="16386" name="Rectangle 5"/>
+          <p:cNvPr id="12292" name="Rectangle 6"/>
           <p:cNvSpPr>
             <a:spLocks noGrp="1" noChangeArrowheads="1"/>
           </p:cNvSpPr>
           <p:nvPr>
-            <p:ph type="ctrTitle" idx="4294967295"/>
+            <p:ph type="title"/>
           </p:nvPr>
         </p:nvSpPr>
         <p:spPr>
           <a:xfrm>
-            <a:off x="685800" y="2317750"/>
-            <a:ext cx="7772400" cy="1470025"/>
+            <a:off x="457200" y="0"/>
+            <a:ext cx="8229600" cy="1219200"/>
           </a:xfrm>
         </p:spPr>
         <p:txBody>
           <a:bodyPr rIns="81279"/>
           <a:lstStyle/>
           <a:p>
-            <a:pPr algn="ctr" eaLnBrk="1" hangingPunct="1"/>
-            <a:r>
-              <a:rPr lang="en-US" sz="3600" dirty="0" smtClean="0">
-                <a:solidFill>
-                  <a:srgbClr val="122956"/>
-                </a:solidFill>
-                <a:latin typeface="Trebuchet MS Bold Italic" charset="0"/>
+            <a:pPr eaLnBrk="1" hangingPunct="1"/>
+            <a:r>
+              <a:rPr lang="en-US" dirty="0" smtClean="0">
+                <a:latin typeface="Trebuchet MS Bold" charset="0"/>
                 <a:ea typeface="ヒラギノ角ゴ ProN W6" charset="0"/>
                 <a:cs typeface="ヒラギノ角ゴ ProN W6" charset="0"/>
-                <a:sym typeface="Trebuchet MS Bold Italic" charset="0"/>
-              </a:rPr>
-              <a:t>Demo: Module Build </a:t>
-            </a:r>
-            <a:br>
-              <a:rPr lang="en-US" sz="3600" dirty="0" smtClean="0">
-                <a:solidFill>
-                  <a:srgbClr val="122956"/>
-                </a:solidFill>
-                <a:latin typeface="Trebuchet MS Bold Italic" charset="0"/>
-                <a:ea typeface="ヒラギノ角ゴ ProN W6" charset="0"/>
-                <a:cs typeface="ヒラギノ角ゴ ProN W6" charset="0"/>
-                <a:sym typeface="Trebuchet MS Bold Italic" charset="0"/>
-              </a:rPr>
-            </a:br>
-            <a:r>
-              <a:rPr lang="en-US" sz="3600" dirty="0" smtClean="0">
-                <a:solidFill>
-                  <a:srgbClr val="122956"/>
-                </a:solidFill>
-                <a:latin typeface="Trebuchet MS Bold Italic" charset="0"/>
-                <a:ea typeface="ヒラギノ角ゴ ProN W6" charset="0"/>
-                <a:cs typeface="ヒラギノ角ゴ ProN W6" charset="0"/>
-                <a:sym typeface="Trebuchet MS Bold Italic" charset="0"/>
-              </a:rPr>
-              <a:t>and Install</a:t>
-            </a:r>
-            <a:endParaRPr lang="en-US" sz="1400" dirty="0">
-              <a:solidFill>
-                <a:srgbClr val="122956"/>
-              </a:solidFill>
-              <a:latin typeface="Trebuchet MS Bold Italic" charset="0"/>
+              </a:rPr>
+              <a:t>Resources</a:t>
+            </a:r>
+            <a:endParaRPr lang="en-US" dirty="0">
+              <a:latin typeface="Trebuchet MS Bold" charset="0"/>
               <a:ea typeface="ヒラギノ角ゴ ProN W6" charset="0"/>
               <a:cs typeface="ヒラギノ角ゴ ProN W6" charset="0"/>
-              <a:sym typeface="Trebuchet MS Bold Italic" charset="0"/>
+            </a:endParaRPr>
+          </a:p>
+        </p:txBody>
+      </p:sp>
+      <p:sp>
+        <p:nvSpPr>
+          <p:cNvPr id="12293" name="Rectangle 7"/>
+          <p:cNvSpPr>
+            <a:spLocks noGrp="1" noChangeArrowheads="1"/>
+          </p:cNvSpPr>
+          <p:nvPr>
+            <p:ph idx="1"/>
+          </p:nvPr>
+        </p:nvSpPr>
+        <p:spPr>
+          <a:xfrm>
+            <a:off x="457200" y="1346200"/>
+            <a:ext cx="8229600" cy="4826000"/>
+          </a:xfrm>
+        </p:spPr>
+        <p:txBody>
+          <a:bodyPr rIns="81279"/>
+          <a:lstStyle/>
+          <a:p>
+            <a:pPr eaLnBrk="1" hangingPunct="1"/>
+            <a:r>
+              <a:rPr lang="en-US" dirty="0" smtClean="0">
+                <a:latin typeface="Trebuchet MS" charset="0"/>
+                <a:ea typeface="ヒラギノ角ゴ ProN W3" charset="0"/>
+                <a:cs typeface="ヒラギノ角ゴ ProN W3" charset="0"/>
+              </a:rPr>
+              <a:t>Platform specific module </a:t>
+            </a:r>
+            <a:r>
+              <a:rPr lang="en-US" dirty="0" err="1" smtClean="0">
+                <a:latin typeface="Trebuchet MS" charset="0"/>
+                <a:ea typeface="ヒラギノ角ゴ ProN W3" charset="0"/>
+                <a:cs typeface="ヒラギノ角ゴ ProN W3" charset="0"/>
+              </a:rPr>
+              <a:t>dev</a:t>
+            </a:r>
+            <a:r>
+              <a:rPr lang="en-US" dirty="0" smtClean="0">
+                <a:latin typeface="Trebuchet MS" charset="0"/>
+                <a:ea typeface="ヒラギノ角ゴ ProN W3" charset="0"/>
+                <a:cs typeface="ヒラギノ角ゴ ProN W3" charset="0"/>
+              </a:rPr>
+              <a:t> guides on wiki</a:t>
+            </a:r>
+          </a:p>
+          <a:p>
+            <a:pPr eaLnBrk="1" hangingPunct="1"/>
+            <a:endParaRPr lang="en-US" dirty="0">
+              <a:latin typeface="Trebuchet MS" charset="0"/>
+              <a:ea typeface="ヒラギノ角ゴ ProN W3" charset="0"/>
+              <a:cs typeface="ヒラギノ角ゴ ProN W3" charset="0"/>
+            </a:endParaRPr>
+          </a:p>
+          <a:p>
+            <a:pPr eaLnBrk="1" hangingPunct="1"/>
+            <a:r>
+              <a:rPr lang="en-US" dirty="0" smtClean="0">
+                <a:latin typeface="Trebuchet MS" charset="0"/>
+                <a:ea typeface="ヒラギノ角ゴ ProN W3" charset="0"/>
+                <a:cs typeface="ヒラギノ角ゴ ProN W3" charset="0"/>
+              </a:rPr>
+              <a:t>github.com/appcelerator/</a:t>
+            </a:r>
+            <a:r>
+              <a:rPr lang="en-US" dirty="0" err="1" smtClean="0">
+                <a:latin typeface="Trebuchet MS" charset="0"/>
+                <a:ea typeface="ヒラギノ角ゴ ProN W3" charset="0"/>
+                <a:cs typeface="ヒラギノ角ゴ ProN W3" charset="0"/>
+              </a:rPr>
+              <a:t>titanium_mobile</a:t>
+            </a:r>
+            <a:endParaRPr lang="en-US" dirty="0" smtClean="0">
+              <a:latin typeface="Trebuchet MS" charset="0"/>
+              <a:ea typeface="ヒラギノ角ゴ ProN W3" charset="0"/>
+              <a:cs typeface="ヒラギノ角ゴ ProN W3" charset="0"/>
+            </a:endParaRPr>
+          </a:p>
+          <a:p>
+            <a:pPr eaLnBrk="1" hangingPunct="1"/>
+            <a:endParaRPr lang="en-US" dirty="0">
+              <a:latin typeface="Trebuchet MS" charset="0"/>
+              <a:ea typeface="ヒラギノ角ゴ ProN W3" charset="0"/>
+              <a:cs typeface="ヒラギノ角ゴ ProN W3" charset="0"/>
+            </a:endParaRPr>
+          </a:p>
+          <a:p>
+            <a:pPr eaLnBrk="1" hangingPunct="1"/>
+            <a:r>
+              <a:rPr lang="en-US" dirty="0" smtClean="0">
+                <a:latin typeface="Trebuchet MS" charset="0"/>
+                <a:ea typeface="ヒラギノ角ゴ ProN W3" charset="0"/>
+                <a:cs typeface="ヒラギノ角ゴ ProN W3" charset="0"/>
+              </a:rPr>
+              <a:t>Again, best resource is existing core Ti modules</a:t>
+            </a:r>
+          </a:p>
+          <a:p>
+            <a:pPr eaLnBrk="1" hangingPunct="1"/>
+            <a:endParaRPr lang="en-US" dirty="0">
+              <a:latin typeface="Trebuchet MS" charset="0"/>
+              <a:ea typeface="ヒラギノ角ゴ ProN W3" charset="0"/>
+              <a:cs typeface="ヒラギノ角ゴ ProN W3" charset="0"/>
+            </a:endParaRPr>
+          </a:p>
+          <a:p>
+            <a:pPr eaLnBrk="1" hangingPunct="1"/>
+            <a:r>
+              <a:rPr lang="en-US" dirty="0" smtClean="0">
+                <a:latin typeface="Trebuchet MS" charset="0"/>
+                <a:ea typeface="ヒラギノ角ゴ ProN W3" charset="0"/>
+                <a:cs typeface="ヒラギノ角ゴ ProN W3" charset="0"/>
+              </a:rPr>
+              <a:t>Anything core Titanium does, you can do in your module</a:t>
+            </a:r>
+            <a:endParaRPr lang="en-US" dirty="0">
+              <a:latin typeface="Trebuchet MS" charset="0"/>
+              <a:ea typeface="ヒラギノ角ゴ ProN W3" charset="0"/>
+              <a:cs typeface="ヒラギノ角ゴ ProN W3" charset="0"/>
             </a:endParaRPr>
           </a:p>
         </p:txBody>
@@ -14074,7 +14307,7 @@
     </p:spTree>
     <p:extLst>
       <p:ext uri="{BB962C8B-B14F-4D97-AF65-F5344CB8AC3E}">
-        <p14:creationId xmlns:p14="http://schemas.microsoft.com/office/powerpoint/2010/main" val="1575128271"/>
+        <p14:creationId xmlns:p14="http://schemas.microsoft.com/office/powerpoint/2010/main" val="709819767"/>
       </p:ext>
     </p:extLst>
   </p:cSld>
@@ -14194,6 +14427,166 @@
                 <a:cs typeface="ヒラギノ角ゴ ProN W6" charset="0"/>
                 <a:sym typeface="Trebuchet MS Bold Italic" charset="0"/>
               </a:rPr>
+              <a:t>Demo: Module Build </a:t>
+            </a:r>
+            <a:br>
+              <a:rPr lang="en-US" sz="3600" dirty="0" smtClean="0">
+                <a:solidFill>
+                  <a:srgbClr val="122956"/>
+                </a:solidFill>
+                <a:latin typeface="Trebuchet MS Bold Italic" charset="0"/>
+                <a:ea typeface="ヒラギノ角ゴ ProN W6" charset="0"/>
+                <a:cs typeface="ヒラギノ角ゴ ProN W6" charset="0"/>
+                <a:sym typeface="Trebuchet MS Bold Italic" charset="0"/>
+              </a:rPr>
+            </a:br>
+            <a:r>
+              <a:rPr lang="en-US" sz="3600" dirty="0" smtClean="0">
+                <a:solidFill>
+                  <a:srgbClr val="122956"/>
+                </a:solidFill>
+                <a:latin typeface="Trebuchet MS Bold Italic" charset="0"/>
+                <a:ea typeface="ヒラギノ角ゴ ProN W6" charset="0"/>
+                <a:cs typeface="ヒラギノ角ゴ ProN W6" charset="0"/>
+                <a:sym typeface="Trebuchet MS Bold Italic" charset="0"/>
+              </a:rPr>
+              <a:t>and Install</a:t>
+            </a:r>
+            <a:endParaRPr lang="en-US" sz="1400" dirty="0">
+              <a:solidFill>
+                <a:srgbClr val="122956"/>
+              </a:solidFill>
+              <a:latin typeface="Trebuchet MS Bold Italic" charset="0"/>
+              <a:ea typeface="ヒラギノ角ゴ ProN W6" charset="0"/>
+              <a:cs typeface="ヒラギノ角ゴ ProN W6" charset="0"/>
+              <a:sym typeface="Trebuchet MS Bold Italic" charset="0"/>
+            </a:endParaRPr>
+          </a:p>
+        </p:txBody>
+      </p:sp>
+    </p:spTree>
+    <p:extLst>
+      <p:ext uri="{BB962C8B-B14F-4D97-AF65-F5344CB8AC3E}">
+        <p14:creationId xmlns:p14="http://schemas.microsoft.com/office/powerpoint/2010/main" val="1575128271"/>
+      </p:ext>
+    </p:extLst>
+  </p:cSld>
+  <p:clrMapOvr>
+    <a:masterClrMapping/>
+  </p:clrMapOvr>
+  <p:transition xmlns:p14="http://schemas.microsoft.com/office/powerpoint/2010/main" spd="slow"/>
+  <p:timing>
+    <p:tnLst>
+      <p:par>
+        <p:cTn xmlns:p14="http://schemas.microsoft.com/office/powerpoint/2010/main" id="1" dur="indefinite" restart="never" nodeType="tmRoot"/>
+      </p:par>
+    </p:tnLst>
+  </p:timing>
+</p:sld>
+</file>
+
+<file path=ppt/slides/slide25.xml><?xml version="1.0" encoding="utf-8"?>
+<p:sld xmlns:a="http://schemas.openxmlformats.org/drawingml/2006/main" xmlns:r="http://schemas.openxmlformats.org/officeDocument/2006/relationships" xmlns:p="http://schemas.openxmlformats.org/presentationml/2006/main">
+  <p:cSld>
+    <p:spTree>
+      <p:nvGrpSpPr>
+        <p:cNvPr id="1" name=""/>
+        <p:cNvGrpSpPr/>
+        <p:nvPr/>
+      </p:nvGrpSpPr>
+      <p:grpSpPr>
+        <a:xfrm>
+          <a:off x="0" y="0"/>
+          <a:ext cx="0" cy="0"/>
+          <a:chOff x="0" y="0"/>
+          <a:chExt cx="0" cy="0"/>
+        </a:xfrm>
+      </p:grpSpPr>
+      <p:pic>
+        <p:nvPicPr>
+          <p:cNvPr id="16385" name="Picture 1"/>
+          <p:cNvPicPr>
+            <a:picLocks noChangeArrowheads="1"/>
+          </p:cNvPicPr>
+          <p:nvPr/>
+        </p:nvPicPr>
+        <p:blipFill>
+          <a:blip r:embed="rId3">
+            <a:extLst>
+              <a:ext uri="{28A0092B-C50C-407E-A947-70E740481C1C}">
+                <a14:useLocalDpi xmlns:a14="http://schemas.microsoft.com/office/drawing/2010/main" val="0"/>
+              </a:ext>
+            </a:extLst>
+          </a:blip>
+          <a:srcRect/>
+          <a:stretch>
+            <a:fillRect/>
+          </a:stretch>
+        </p:blipFill>
+        <p:spPr bwMode="auto">
+          <a:xfrm>
+            <a:off x="8505825" y="6311900"/>
+            <a:ext cx="442913" cy="357188"/>
+          </a:xfrm>
+          <a:prstGeom prst="rect">
+            <a:avLst/>
+          </a:prstGeom>
+          <a:noFill/>
+          <a:ln>
+            <a:noFill/>
+          </a:ln>
+          <a:extLst>
+            <a:ext uri="{909E8E84-426E-40dd-AFC4-6F175D3DCCD1}">
+              <a14:hiddenFill xmlns:a14="http://schemas.microsoft.com/office/drawing/2010/main">
+                <a:solidFill>
+                  <a:srgbClr val="FFFFFF"/>
+                </a:solidFill>
+              </a14:hiddenFill>
+            </a:ext>
+            <a:ext uri="{91240B29-F687-4f45-9708-019B960494DF}">
+              <a14:hiddenLine xmlns:a14="http://schemas.microsoft.com/office/drawing/2010/main" w="9525">
+                <a:solidFill>
+                  <a:srgbClr val="000000"/>
+                </a:solidFill>
+                <a:miter lim="800000"/>
+                <a:headEnd/>
+                <a:tailEnd/>
+              </a14:hiddenLine>
+            </a:ext>
+          </a:extLst>
+        </p:spPr>
+      </p:pic>
+      <p:sp>
+        <p:nvSpPr>
+          <p:cNvPr id="16386" name="Rectangle 5"/>
+          <p:cNvSpPr>
+            <a:spLocks noGrp="1" noChangeArrowheads="1"/>
+          </p:cNvSpPr>
+          <p:nvPr>
+            <p:ph type="ctrTitle" idx="4294967295"/>
+          </p:nvPr>
+        </p:nvSpPr>
+        <p:spPr>
+          <a:xfrm>
+            <a:off x="685800" y="2317750"/>
+            <a:ext cx="7772400" cy="1470025"/>
+          </a:xfrm>
+        </p:spPr>
+        <p:txBody>
+          <a:bodyPr rIns="81279"/>
+          <a:lstStyle/>
+          <a:p>
+            <a:pPr algn="ctr" eaLnBrk="1" hangingPunct="1"/>
+            <a:r>
+              <a:rPr lang="en-US" sz="3600" dirty="0" smtClean="0">
+                <a:solidFill>
+                  <a:srgbClr val="122956"/>
+                </a:solidFill>
+                <a:latin typeface="Trebuchet MS Bold Italic" charset="0"/>
+                <a:ea typeface="ヒラギノ角ゴ ProN W6" charset="0"/>
+                <a:cs typeface="ヒラギノ角ゴ ProN W6" charset="0"/>
+                <a:sym typeface="Trebuchet MS Bold Italic" charset="0"/>
+              </a:rPr>
               <a:t>Q&amp;A</a:t>
             </a:r>
             <a:endParaRPr lang="en-US" sz="1400" dirty="0">
@@ -14229,7 +14622,7 @@
 </p:sld>
 </file>
 
-<file path=ppt/slides/slide25.xml><?xml version="1.0" encoding="utf-8"?>
+<file path=ppt/slides/slide26.xml><?xml version="1.0" encoding="utf-8"?>
 <p:sld xmlns:a="http://schemas.openxmlformats.org/drawingml/2006/main" xmlns:r="http://schemas.openxmlformats.org/officeDocument/2006/relationships" xmlns:p="http://schemas.openxmlformats.org/presentationml/2006/main">
   <p:cSld>
     <p:spTree>
@@ -15768,7 +16161,18 @@
                 <a:ea typeface="ヒラギノ角ゴ ProN W3" charset="0"/>
                 <a:cs typeface="ヒラギノ角ゴ ProN W3" charset="0"/>
               </a:rPr>
-              <a:t>What is Kroll?</a:t>
+              <a:t>What is Kroll? </a:t>
+            </a:r>
+          </a:p>
+          <a:p>
+            <a:pPr eaLnBrk="1" hangingPunct="1"/>
+            <a:r>
+              <a:rPr lang="en-US" dirty="0">
+                <a:latin typeface="Trebuchet MS" charset="0"/>
+                <a:ea typeface="ヒラギノ角ゴ ProN W3" charset="0"/>
+                <a:cs typeface="ヒラギノ角ゴ ProN W3" charset="0"/>
+              </a:rPr>
+              <a:t>	</a:t>
             </a:r>
             <a:r>
               <a:rPr lang="en-US" dirty="0" smtClean="0">
@@ -15776,34 +16180,7 @@
                 <a:ea typeface="ヒラギノ角ゴ ProN W3" charset="0"/>
                 <a:cs typeface="ヒラギノ角ゴ ProN W3" charset="0"/>
               </a:rPr>
-              <a:t> </a:t>
-            </a:r>
-          </a:p>
-          <a:p>
-            <a:pPr eaLnBrk="1" hangingPunct="1"/>
-            <a:r>
-              <a:rPr lang="en-US" dirty="0">
-                <a:latin typeface="Trebuchet MS" charset="0"/>
-                <a:ea typeface="ヒラギノ角ゴ ProN W3" charset="0"/>
-                <a:cs typeface="ヒラギノ角ゴ ProN W3" charset="0"/>
-              </a:rPr>
-              <a:t>	</a:t>
-            </a:r>
-            <a:r>
-              <a:rPr lang="en-US" dirty="0" smtClean="0">
-                <a:latin typeface="Trebuchet MS" charset="0"/>
-                <a:ea typeface="ヒラギノ角ゴ ProN W3" charset="0"/>
-                <a:cs typeface="ヒラギノ角ゴ ProN W3" charset="0"/>
-              </a:rPr>
-              <a:t>- </a:t>
-            </a:r>
-            <a:r>
-              <a:rPr lang="en-US" dirty="0" smtClean="0">
-                <a:latin typeface="Trebuchet MS" charset="0"/>
-                <a:ea typeface="ヒラギノ角ゴ ProN W3" charset="0"/>
-                <a:cs typeface="ヒラギノ角ゴ ProN W3" charset="0"/>
-              </a:rPr>
-              <a:t>Metallurgical process by which titanium (the element) is created</a:t>
+              <a:t>- Metallurgical process by which titanium (the element) is created</a:t>
             </a:r>
           </a:p>
           <a:p>
@@ -15892,11 +16269,6 @@
               </a:rPr>
               <a:t>	- http://en.wikipedia.org/wiki/Kernel_(computing)</a:t>
             </a:r>
-            <a:endParaRPr lang="en-US" dirty="0">
-              <a:latin typeface="Trebuchet MS" charset="0"/>
-              <a:ea typeface="ヒラギノ角ゴ ProN W3" charset="0"/>
-              <a:cs typeface="ヒラギノ角ゴ ProN W3" charset="0"/>
-            </a:endParaRPr>
           </a:p>
         </p:txBody>
       </p:sp>
@@ -16474,19 +16846,7 @@
                 <a:cs typeface="ヒラギノ角ゴ ProN W6" charset="0"/>
                 <a:sym typeface="Trebuchet MS Bold Italic" charset="0"/>
               </a:rPr>
-              <a:t>Module</a:t>
-            </a:r>
-            <a:r>
-              <a:rPr lang="en-US" sz="3600" dirty="0" smtClean="0">
-                <a:solidFill>
-                  <a:srgbClr val="122956"/>
-                </a:solidFill>
-                <a:latin typeface="Trebuchet MS Bold Italic" charset="0"/>
-                <a:ea typeface="ヒラギノ角ゴ ProN W6" charset="0"/>
-                <a:cs typeface="ヒラギノ角ゴ ProN W6" charset="0"/>
-                <a:sym typeface="Trebuchet MS Bold Italic" charset="0"/>
-              </a:rPr>
-              <a:t>!</a:t>
+              <a:t>Module!</a:t>
             </a:r>
             <a:endParaRPr lang="en-US" sz="1400" dirty="0">
               <a:solidFill>

</xml_diff>